<commit_message>
create nav bar background design
</commit_message>
<xml_diff>
--- a/sw챌린지 공모전 발표자료/디자인.pptx
+++ b/sw챌린지 공모전 발표자료/디자인.pptx
@@ -5733,6 +5733,78 @@
           <a:p>
             <a:pPr algn="ctr"/>
             <a:endParaRPr lang="ko-KR" altLang="en-US"/>
+          </a:p>
+        </p:txBody>
+      </p:sp>
+      <p:sp>
+        <p:nvSpPr>
+          <p:cNvPr id="20" name="직사각형 19"/>
+          <p:cNvSpPr/>
+          <p:nvPr/>
+        </p:nvSpPr>
+        <p:spPr>
+          <a:xfrm>
+            <a:off x="4897807" y="1555432"/>
+            <a:ext cx="5267578" cy="4465871"/>
+          </a:xfrm>
+          <a:prstGeom prst="rect">
+            <a:avLst/>
+          </a:prstGeom>
+          <a:gradFill flip="none" rotWithShape="1">
+            <a:gsLst>
+              <a:gs pos="0">
+                <a:srgbClr val="0036A2">
+                  <a:shade val="30000"/>
+                  <a:satMod val="115000"/>
+                </a:srgbClr>
+              </a:gs>
+              <a:gs pos="50000">
+                <a:srgbClr val="0036A2">
+                  <a:shade val="67500"/>
+                  <a:satMod val="115000"/>
+                </a:srgbClr>
+              </a:gs>
+              <a:gs pos="100000">
+                <a:schemeClr val="accent5">
+                  <a:lumMod val="75000"/>
+                </a:schemeClr>
+              </a:gs>
+              <a:gs pos="86000">
+                <a:srgbClr val="0036A2">
+                  <a:shade val="100000"/>
+                  <a:satMod val="115000"/>
+                </a:srgbClr>
+              </a:gs>
+            </a:gsLst>
+            <a:lin ang="2700000" scaled="1"/>
+            <a:tileRect/>
+          </a:gradFill>
+          <a:ln>
+            <a:noFill/>
+          </a:ln>
+        </p:spPr>
+        <p:style>
+          <a:lnRef idx="2">
+            <a:schemeClr val="accent1">
+              <a:shade val="50000"/>
+            </a:schemeClr>
+          </a:lnRef>
+          <a:fillRef idx="1">
+            <a:schemeClr val="accent1"/>
+          </a:fillRef>
+          <a:effectRef idx="0">
+            <a:schemeClr val="accent1"/>
+          </a:effectRef>
+          <a:fontRef idx="minor">
+            <a:schemeClr val="lt1"/>
+          </a:fontRef>
+        </p:style>
+        <p:txBody>
+          <a:bodyPr rtlCol="0" anchor="ctr"/>
+          <a:lstStyle/>
+          <a:p>
+            <a:pPr algn="ctr"/>
+            <a:endParaRPr lang="ko-KR" altLang="en-US" dirty="0"/>
           </a:p>
         </p:txBody>
       </p:sp>

</xml_diff>